<commit_message>
get ready to pull
</commit_message>
<xml_diff>
--- a/CH0/l1-GettingStarted.pptx
+++ b/CH0/l1-GettingStarted.pptx
@@ -24,6 +24,7 @@
     <p:sldId id="272" r:id="rId18"/>
     <p:sldId id="273" r:id="rId19"/>
     <p:sldId id="274" r:id="rId20"/>
+    <p:sldId id="275" r:id="rId21"/>
   </p:sldIdLst>
   <p:sldSz cx="12192000" cy="6858000"/>
   <p:notesSz cx="6858000" cy="9144000"/>
@@ -3270,13 +3271,7 @@
               <a:rPr lang="en-US" dirty="0" smtClean="0">
                 <a:sym typeface="Wingdings" panose="05000000000000000000" pitchFamily="2" charset="2"/>
               </a:rPr>
-              <a:t>’ (you can use a different name if you want</a:t>
-            </a:r>
-            <a:r>
-              <a:rPr lang="en-US" dirty="0" smtClean="0">
-                <a:sym typeface="Wingdings" panose="05000000000000000000" pitchFamily="2" charset="2"/>
-              </a:rPr>
-              <a:t>.)</a:t>
+              <a:t>’ (you can use a different name if you want.)</a:t>
             </a:r>
           </a:p>
         </p:txBody>
@@ -3898,21 +3893,8 @@
             </a:r>
             <a:r>
               <a:rPr lang="en-US" dirty="0" smtClean="0"/>
-              <a:t> </a:t>
-            </a:r>
-            <a:r>
-              <a:rPr lang="en-US" dirty="0" smtClean="0"/>
-              <a:t>clone https</a:t>
-            </a:r>
-            <a:r>
-              <a:rPr lang="en-US" dirty="0" smtClean="0"/>
-              <a:t>://</a:t>
-            </a:r>
-            <a:r>
-              <a:rPr lang="en-US" dirty="0" smtClean="0"/>
-              <a:t>github.com/elrossco2/LearnPython.git</a:t>
-            </a:r>
-            <a:endParaRPr lang="en-US" dirty="0" smtClean="0"/>
+              <a:t> clone https://github.com/elrossco2/LearnPython.git</a:t>
+            </a:r>
           </a:p>
           <a:p>
             <a:pPr>
@@ -3940,11 +3922,7 @@
           <a:p>
             <a:r>
               <a:rPr lang="en-US" dirty="0" smtClean="0"/>
-              <a:t>Get ready to clone </a:t>
-            </a:r>
-            <a:r>
-              <a:rPr lang="en-US" dirty="0" smtClean="0"/>
-              <a:t>your </a:t>
+              <a:t>Get ready to clone your </a:t>
             </a:r>
             <a:r>
               <a:rPr lang="en-US" dirty="0" err="1" smtClean="0"/>
@@ -3952,11 +3930,7 @@
             </a:r>
             <a:r>
               <a:rPr lang="en-US" dirty="0" smtClean="0"/>
-              <a:t> </a:t>
-            </a:r>
-            <a:r>
-              <a:rPr lang="en-US" dirty="0" smtClean="0"/>
-              <a:t>repository from the remote:</a:t>
+              <a:t> repository from the remote:</a:t>
             </a:r>
             <a:endParaRPr lang="en-US" dirty="0"/>
           </a:p>
@@ -4484,15 +4458,7 @@
             </a:r>
             <a:r>
               <a:rPr lang="en-US" dirty="0" smtClean="0"/>
-              <a:t> </a:t>
-            </a:r>
-            <a:r>
-              <a:rPr lang="en-US" dirty="0" smtClean="0"/>
-              <a:t>clone https</a:t>
-            </a:r>
-            <a:r>
-              <a:rPr lang="en-US" dirty="0" smtClean="0"/>
-              <a:t>://github.com/elrossco2/LearnPython.git</a:t>
+              <a:t> clone https://github.com/elrossco2/LearnPython.git</a:t>
             </a:r>
           </a:p>
           <a:p>
@@ -4801,11 +4767,7 @@
             </a:r>
             <a:r>
               <a:rPr lang="en-US" dirty="0" smtClean="0"/>
-              <a:t> </a:t>
-            </a:r>
-            <a:r>
-              <a:rPr lang="en-US" dirty="0" smtClean="0"/>
-              <a:t>Documents\GitHub\</a:t>
+              <a:t> Documents\GitHub\</a:t>
             </a:r>
             <a:r>
               <a:rPr lang="en-US" dirty="0" err="1" smtClean="0"/>
@@ -6043,11 +6005,7 @@
           <a:p>
             <a:r>
               <a:rPr lang="en-US" dirty="0" smtClean="0"/>
-              <a:t>If you’re running Linux then most likely Python is already installed. Just type python at the command line</a:t>
-            </a:r>
-            <a:r>
-              <a:rPr lang="en-US" dirty="0" smtClean="0"/>
-              <a:t>.</a:t>
+              <a:t>If you’re running Linux then most likely Python is already installed. Just type python at the command line.</a:t>
             </a:r>
           </a:p>
           <a:p>
@@ -6076,19 +6034,7 @@
           <a:p>
             <a:r>
               <a:rPr lang="en-US" dirty="0" smtClean="0"/>
-              <a:t>If your using </a:t>
-            </a:r>
-            <a:r>
-              <a:rPr lang="en-US" dirty="0" smtClean="0"/>
-              <a:t>Windows, download </a:t>
-            </a:r>
-            <a:r>
-              <a:rPr lang="en-US" dirty="0" smtClean="0"/>
-              <a:t>and install the latest </a:t>
-            </a:r>
-            <a:r>
-              <a:rPr lang="en-US" dirty="0" smtClean="0"/>
-              <a:t>version.</a:t>
+              <a:t>If your using Windows, download and install the latest version.</a:t>
             </a:r>
             <a:endParaRPr lang="en-US" dirty="0"/>
           </a:p>
@@ -6140,6 +6086,218 @@
 </p:sld>
 </file>
 
+<file path=ppt/slides/slide20.xml><?xml version="1.0" encoding="utf-8"?>
+<p:sld xmlns:a="http://schemas.openxmlformats.org/drawingml/2006/main" xmlns:r="http://schemas.openxmlformats.org/officeDocument/2006/relationships" xmlns:p="http://schemas.openxmlformats.org/presentationml/2006/main">
+  <p:cSld>
+    <p:spTree>
+      <p:nvGrpSpPr>
+        <p:cNvPr id="1" name=""/>
+        <p:cNvGrpSpPr/>
+        <p:nvPr/>
+      </p:nvGrpSpPr>
+      <p:grpSpPr>
+        <a:xfrm>
+          <a:off x="0" y="0"/>
+          <a:ext cx="0" cy="0"/>
+          <a:chOff x="0" y="0"/>
+          <a:chExt cx="0" cy="0"/>
+        </a:xfrm>
+      </p:grpSpPr>
+      <p:sp>
+        <p:nvSpPr>
+          <p:cNvPr id="2" name="TextBox 1"/>
+          <p:cNvSpPr txBox="1"/>
+          <p:nvPr/>
+        </p:nvSpPr>
+        <p:spPr>
+          <a:xfrm>
+            <a:off x="774700" y="228600"/>
+            <a:ext cx="3238500" cy="461665"/>
+          </a:xfrm>
+          <a:prstGeom prst="rect">
+            <a:avLst/>
+          </a:prstGeom>
+          <a:noFill/>
+        </p:spPr>
+        <p:txBody>
+          <a:bodyPr wrap="square" rtlCol="0">
+            <a:spAutoFit/>
+          </a:bodyPr>
+          <a:lstStyle/>
+          <a:p>
+            <a:r>
+              <a:rPr lang="en-US" sz="2400" dirty="0" smtClean="0"/>
+              <a:t>Workflow for CS3003</a:t>
+            </a:r>
+            <a:endParaRPr lang="en-US" sz="2400" dirty="0"/>
+          </a:p>
+        </p:txBody>
+      </p:sp>
+      <p:sp>
+        <p:nvSpPr>
+          <p:cNvPr id="3" name="TextBox 2"/>
+          <p:cNvSpPr txBox="1"/>
+          <p:nvPr/>
+        </p:nvSpPr>
+        <p:spPr>
+          <a:xfrm>
+            <a:off x="203200" y="812800"/>
+            <a:ext cx="4103687" cy="2308324"/>
+          </a:xfrm>
+          <a:prstGeom prst="rect">
+            <a:avLst/>
+          </a:prstGeom>
+          <a:noFill/>
+        </p:spPr>
+        <p:txBody>
+          <a:bodyPr wrap="square" rtlCol="0">
+            <a:spAutoFit/>
+          </a:bodyPr>
+          <a:lstStyle/>
+          <a:p>
+            <a:r>
+              <a:rPr lang="en-US" dirty="0" smtClean="0"/>
+              <a:t>Posting to the </a:t>
+            </a:r>
+            <a:r>
+              <a:rPr lang="en-US" dirty="0" err="1" smtClean="0"/>
+              <a:t>DiscussionBoard</a:t>
+            </a:r>
+            <a:r>
+              <a:rPr lang="en-US" dirty="0" smtClean="0"/>
+              <a:t>:</a:t>
+            </a:r>
+          </a:p>
+          <a:p>
+            <a:pPr marL="285750" indent="-285750">
+              <a:buFont typeface="Wingdings" panose="05000000000000000000" pitchFamily="2" charset="2"/>
+              <a:buChar char="Ø"/>
+            </a:pPr>
+            <a:r>
+              <a:rPr lang="en-US" dirty="0" err="1" smtClean="0"/>
+              <a:t>gitpad</a:t>
+            </a:r>
+            <a:r>
+              <a:rPr lang="en-US" dirty="0" smtClean="0"/>
+              <a:t> </a:t>
+            </a:r>
+            <a:r>
+              <a:rPr lang="en-US" dirty="0" err="1" smtClean="0"/>
+              <a:t>DiscussionBoard</a:t>
+            </a:r>
+            <a:endParaRPr lang="en-US" dirty="0" smtClean="0"/>
+          </a:p>
+          <a:p>
+            <a:r>
+              <a:rPr lang="en-US" dirty="0" smtClean="0"/>
+              <a:t>Make a new post.</a:t>
+            </a:r>
+          </a:p>
+          <a:p>
+            <a:pPr marL="285750" indent="-285750">
+              <a:buFont typeface="Wingdings" panose="05000000000000000000" pitchFamily="2" charset="2"/>
+              <a:buChar char="Ø"/>
+            </a:pPr>
+            <a:r>
+              <a:rPr lang="en-US" dirty="0" err="1" smtClean="0"/>
+              <a:t>git</a:t>
+            </a:r>
+            <a:r>
+              <a:rPr lang="en-US" dirty="0" smtClean="0"/>
+              <a:t> add </a:t>
+            </a:r>
+            <a:r>
+              <a:rPr lang="en-US" dirty="0" err="1" smtClean="0"/>
+              <a:t>DiscussionBoard</a:t>
+            </a:r>
+            <a:endParaRPr lang="en-US" dirty="0" smtClean="0"/>
+          </a:p>
+          <a:p>
+            <a:pPr marL="285750" indent="-285750">
+              <a:buFont typeface="Wingdings" panose="05000000000000000000" pitchFamily="2" charset="2"/>
+              <a:buChar char="Ø"/>
+            </a:pPr>
+            <a:r>
+              <a:rPr lang="en-US" dirty="0" err="1" smtClean="0"/>
+              <a:t>git</a:t>
+            </a:r>
+            <a:r>
+              <a:rPr lang="en-US" dirty="0" smtClean="0"/>
+              <a:t> commit –m “posted to discussion.”</a:t>
+            </a:r>
+          </a:p>
+          <a:p>
+            <a:pPr marL="285750" indent="-285750">
+              <a:buFont typeface="Wingdings" panose="05000000000000000000" pitchFamily="2" charset="2"/>
+              <a:buChar char="Ø"/>
+            </a:pPr>
+            <a:r>
+              <a:rPr lang="en-US" dirty="0" err="1" smtClean="0"/>
+              <a:t>git</a:t>
+            </a:r>
+            <a:r>
+              <a:rPr lang="en-US" dirty="0" smtClean="0"/>
+              <a:t> push </a:t>
+            </a:r>
+            <a:r>
+              <a:rPr lang="en-US" smtClean="0"/>
+              <a:t>origin master</a:t>
+            </a:r>
+            <a:endParaRPr lang="en-US" dirty="0" smtClean="0"/>
+          </a:p>
+          <a:p>
+            <a:pPr marL="285750" indent="-285750">
+              <a:buFont typeface="Wingdings" panose="05000000000000000000" pitchFamily="2" charset="2"/>
+              <a:buChar char="Ø"/>
+            </a:pPr>
+            <a:endParaRPr lang="en-US" dirty="0" smtClean="0"/>
+          </a:p>
+          <a:p>
+            <a:pPr marL="285750" indent="-285750">
+              <a:buFont typeface="Wingdings" panose="05000000000000000000" pitchFamily="2" charset="2"/>
+              <a:buChar char="Ø"/>
+            </a:pPr>
+            <a:endParaRPr lang="en-US" dirty="0" smtClean="0"/>
+          </a:p>
+        </p:txBody>
+      </p:sp>
+      <p:pic>
+        <p:nvPicPr>
+          <p:cNvPr id="4" name="Picture 3"/>
+          <p:cNvPicPr>
+            <a:picLocks noChangeAspect="1"/>
+          </p:cNvPicPr>
+          <p:nvPr/>
+        </p:nvPicPr>
+        <p:blipFill>
+          <a:blip r:embed="rId2"/>
+          <a:stretch>
+            <a:fillRect/>
+          </a:stretch>
+        </p:blipFill>
+        <p:spPr>
+          <a:xfrm>
+            <a:off x="4306887" y="228600"/>
+            <a:ext cx="7820025" cy="6286500"/>
+          </a:xfrm>
+          <a:prstGeom prst="rect">
+            <a:avLst/>
+          </a:prstGeom>
+        </p:spPr>
+      </p:pic>
+    </p:spTree>
+    <p:extLst>
+      <p:ext uri="{BB962C8B-B14F-4D97-AF65-F5344CB8AC3E}">
+        <p14:creationId xmlns:p14="http://schemas.microsoft.com/office/powerpoint/2010/main" val="3872136779"/>
+      </p:ext>
+    </p:extLst>
+  </p:cSld>
+  <p:clrMapOvr>
+    <a:masterClrMapping/>
+  </p:clrMapOvr>
+</p:sld>
+</file>
+
 <file path=ppt/slides/slide3.xml><?xml version="1.0" encoding="utf-8"?>
 <p:sld xmlns:a="http://schemas.openxmlformats.org/drawingml/2006/main" xmlns:r="http://schemas.openxmlformats.org/officeDocument/2006/relationships" xmlns:p="http://schemas.openxmlformats.org/presentationml/2006/main">
   <p:cSld>
@@ -6174,15 +6332,7 @@
           <a:p>
             <a:r>
               <a:rPr lang="en-US" dirty="0" smtClean="0"/>
-              <a:t>Be sure to add </a:t>
-            </a:r>
-            <a:r>
-              <a:rPr lang="en-US" dirty="0" smtClean="0"/>
-              <a:t>Python </a:t>
-            </a:r>
-            <a:r>
-              <a:rPr lang="en-US" dirty="0" smtClean="0"/>
-              <a:t>to your PATH</a:t>
+              <a:t>Be sure to add Python to your PATH</a:t>
             </a:r>
             <a:endParaRPr lang="en-US" dirty="0"/>
           </a:p>
@@ -6259,13 +6409,7 @@
               <a:rPr lang="en-US" dirty="0" smtClean="0">
                 <a:sym typeface="Wingdings" panose="05000000000000000000" pitchFamily="2" charset="2"/>
               </a:rPr>
-              <a:t> Install </a:t>
-            </a:r>
-            <a:r>
-              <a:rPr lang="en-US" dirty="0" smtClean="0">
-                <a:sym typeface="Wingdings" panose="05000000000000000000" pitchFamily="2" charset="2"/>
-              </a:rPr>
-              <a:t>Now</a:t>
+              <a:t> Install Now</a:t>
             </a:r>
           </a:p>
           <a:p>
@@ -6295,11 +6439,7 @@
           <a:p>
             <a:r>
               <a:rPr lang="en-US" dirty="0" smtClean="0"/>
-              <a:t>But first--click </a:t>
-            </a:r>
-            <a:r>
-              <a:rPr lang="en-US" dirty="0" smtClean="0"/>
-              <a:t>the bottom checkbox</a:t>
+              <a:t>But first--click the bottom checkbox</a:t>
             </a:r>
           </a:p>
           <a:p>
@@ -6317,11 +6457,7 @@
             </a:r>
             <a:r>
               <a:rPr lang="en-US" dirty="0" smtClean="0"/>
-              <a:t> </a:t>
-            </a:r>
-            <a:r>
-              <a:rPr lang="en-US" dirty="0" smtClean="0"/>
-              <a:t>to PATH</a:t>
+              <a:t> to PATH</a:t>
             </a:r>
             <a:endParaRPr lang="en-US" dirty="0"/>
           </a:p>
@@ -6943,11 +7079,7 @@
             </a:r>
             <a:r>
               <a:rPr lang="en-US" dirty="0" smtClean="0"/>
-              <a:t>Shell </a:t>
-            </a:r>
-            <a:r>
-              <a:rPr lang="en-US" dirty="0" smtClean="0"/>
-              <a:t>(</a:t>
+              <a:t>Shell (</a:t>
             </a:r>
             <a:r>
               <a:rPr lang="en-US" dirty="0" err="1"/>
@@ -7392,11 +7524,7 @@
           <a:p>
             <a:r>
               <a:rPr lang="en-US" dirty="0" smtClean="0"/>
-              <a:t>Get </a:t>
-            </a:r>
-            <a:r>
-              <a:rPr lang="en-US" dirty="0" smtClean="0"/>
-              <a:t>the free book Pro </a:t>
+              <a:t>Get the free book Pro </a:t>
             </a:r>
             <a:r>
               <a:rPr lang="en-US" dirty="0" err="1" smtClean="0"/>
@@ -7608,11 +7736,7 @@
             </a:r>
             <a:r>
               <a:rPr lang="en-US" dirty="0" smtClean="0"/>
-              <a:t>ou </a:t>
-            </a:r>
-            <a:r>
-              <a:rPr lang="en-US" dirty="0" smtClean="0"/>
-              <a:t>can have a </a:t>
+              <a:t>ou can have a </a:t>
             </a:r>
             <a:r>
               <a:rPr lang="en-US" dirty="0" err="1" smtClean="0"/>
@@ -7620,15 +7744,7 @@
             </a:r>
             <a:r>
               <a:rPr lang="en-US" dirty="0" smtClean="0"/>
-              <a:t> repository on your own server. </a:t>
-            </a:r>
-            <a:r>
-              <a:rPr lang="en-US" dirty="0" smtClean="0"/>
-              <a:t>For use, its most </a:t>
-            </a:r>
-            <a:r>
-              <a:rPr lang="en-US" dirty="0" smtClean="0"/>
-              <a:t>easy just to have it at github.com</a:t>
+              <a:t> repository on your own server. For use, its most easy just to have it at github.com</a:t>
             </a:r>
             <a:endParaRPr lang="en-US" dirty="0"/>
           </a:p>

</xml_diff>